<commit_message>
Updating slides for both presentations for MS Access
</commit_message>
<xml_diff>
--- a/Courses/Software-Sciences/Module-3-Databases-New/13-MS-Access/13-MS-Access-Basics.pptx
+++ b/Courses/Software-Sciences/Module-3-Databases-New/13-MS-Access/13-MS-Access-Basics.pptx
@@ -341,7 +341,7 @@
           <a:p>
             <a:fld id="{4E087215-0C8F-4762-A664-737A353EC9A4}" type="datetimeFigureOut">
               <a:rPr lang="bg-BG" smtClean="0"/>
-              <a:t>18.12.2023 г.</a:t>
+              <a:t>16.4.2024 г.</a:t>
             </a:fld>
             <a:endParaRPr lang="bg-BG"/>
           </a:p>
@@ -537,7 +537,7 @@
           <a:p>
             <a:fld id="{72D84649-876A-46C9-8472-14CB09C070D8}" type="datetimeFigureOut">
               <a:rPr lang="en-US" smtClean="0"/>
-              <a:t>12/18/2023</a:t>
+              <a:t>4/16/2024</a:t>
             </a:fld>
             <a:endParaRPr lang="en-US"/>
           </a:p>
@@ -13218,8 +13218,8 @@
         </p:nvSpPr>
         <p:spPr>
           <a:xfrm>
-            <a:off x="291000" y="1224000"/>
-            <a:ext cx="8460000" cy="5520646"/>
+            <a:off x="190405" y="1224000"/>
+            <a:ext cx="8560595" cy="5520646"/>
           </a:xfrm>
         </p:spPr>
         <p:txBody>
@@ -13391,7 +13391,7 @@
             </a:pPr>
             <a:r>
               <a:rPr lang="bg-BG" sz="3600" dirty="0"/>
-              <a:t>Импорт от </a:t>
+              <a:t>Импортиране от </a:t>
             </a:r>
             <a:r>
               <a:rPr lang="bg-BG" sz="3600" b="1" dirty="0">

</xml_diff>

<commit_message>
Updates on presentations for MS Access
</commit_message>
<xml_diff>
--- a/Courses/Software-Sciences/Module-3-Databases-New/13-MS-Access/13-MS-Access-Basics.pptx
+++ b/Courses/Software-Sciences/Module-3-Databases-New/13-MS-Access/13-MS-Access-Basics.pptx
@@ -341,7 +341,7 @@
           <a:p>
             <a:fld id="{4E087215-0C8F-4762-A664-737A353EC9A4}" type="datetimeFigureOut">
               <a:rPr lang="bg-BG" smtClean="0"/>
-              <a:t>31.07.24 г.</a:t>
+              <a:t>26.8.2024 г.</a:t>
             </a:fld>
             <a:endParaRPr lang="bg-BG"/>
           </a:p>
@@ -537,7 +537,7 @@
           <a:p>
             <a:fld id="{72D84649-876A-46C9-8472-14CB09C070D8}" type="datetimeFigureOut">
               <a:rPr lang="en-US" smtClean="0"/>
-              <a:t>7/31/24</a:t>
+              <a:t>8/26/2024</a:t>
             </a:fld>
             <a:endParaRPr lang="en-US"/>
           </a:p>
@@ -20359,7 +20359,10 @@
           <a:noFill/>
           <a:ln w="57150">
             <a:solidFill>
-              <a:schemeClr val="tx1"/>
+              <a:schemeClr val="bg1">
+                <a:lumMod val="60000"/>
+                <a:lumOff val="40000"/>
+              </a:schemeClr>
             </a:solidFill>
             <a:prstDash val="solid"/>
           </a:ln>
@@ -20426,7 +20429,10 @@
           <a:noFill/>
           <a:ln w="57150">
             <a:solidFill>
-              <a:schemeClr val="tx1"/>
+              <a:schemeClr val="bg1">
+                <a:lumMod val="60000"/>
+                <a:lumOff val="40000"/>
+              </a:schemeClr>
             </a:solidFill>
             <a:prstDash val="solid"/>
           </a:ln>

</xml_diff>